<commit_message>
Updated Notfication with Permissions
</commit_message>
<xml_diff>
--- a/docs/PWA-Final.pptx
+++ b/docs/PWA-Final.pptx
@@ -11741,7 +11741,7 @@
           <a:p>
             <a:fld id="{BBEDABB0-A519-44FC-945D-192D2BADBA43}" type="datetimeFigureOut">
               <a:rPr lang="en-US" smtClean="0"/>
-              <a:t>11/26/2019</a:t>
+              <a:t>12/16/2019</a:t>
             </a:fld>
             <a:endParaRPr lang="en-US"/>
           </a:p>
@@ -11983,7 +11983,7 @@
           <a:p>
             <a:fld id="{3A57EC39-4E20-4BC2-A092-74C62013EBA7}" type="datetimeFigureOut">
               <a:rPr lang="en-US" smtClean="0"/>
-              <a:t>11/26/2019</a:t>
+              <a:t>12/16/2019</a:t>
             </a:fld>
             <a:endParaRPr lang="en-US"/>
           </a:p>
@@ -12181,7 +12181,7 @@
           <a:p>
             <a:fld id="{3A57EC39-4E20-4BC2-A092-74C62013EBA7}" type="datetimeFigureOut">
               <a:rPr lang="en-US" smtClean="0"/>
-              <a:t>11/26/2019</a:t>
+              <a:t>12/16/2019</a:t>
             </a:fld>
             <a:endParaRPr lang="en-US"/>
           </a:p>
@@ -12389,7 +12389,7 @@
           <a:p>
             <a:fld id="{3A57EC39-4E20-4BC2-A092-74C62013EBA7}" type="datetimeFigureOut">
               <a:rPr lang="en-US" smtClean="0"/>
-              <a:t>11/26/2019</a:t>
+              <a:t>12/16/2019</a:t>
             </a:fld>
             <a:endParaRPr lang="en-US"/>
           </a:p>
@@ -12587,7 +12587,7 @@
           <a:p>
             <a:fld id="{3A57EC39-4E20-4BC2-A092-74C62013EBA7}" type="datetimeFigureOut">
               <a:rPr lang="en-US" smtClean="0"/>
-              <a:t>11/26/2019</a:t>
+              <a:t>12/16/2019</a:t>
             </a:fld>
             <a:endParaRPr lang="en-US"/>
           </a:p>
@@ -12898,7 +12898,7 @@
           <a:p>
             <a:fld id="{3A57EC39-4E20-4BC2-A092-74C62013EBA7}" type="datetimeFigureOut">
               <a:rPr lang="en-US" smtClean="0"/>
-              <a:t>11/26/2019</a:t>
+              <a:t>12/16/2019</a:t>
             </a:fld>
             <a:endParaRPr lang="en-US"/>
           </a:p>
@@ -13163,7 +13163,7 @@
           <a:p>
             <a:fld id="{3A57EC39-4E20-4BC2-A092-74C62013EBA7}" type="datetimeFigureOut">
               <a:rPr lang="en-US" smtClean="0"/>
-              <a:t>11/26/2019</a:t>
+              <a:t>12/16/2019</a:t>
             </a:fld>
             <a:endParaRPr lang="en-US"/>
           </a:p>
@@ -13575,7 +13575,7 @@
           <a:p>
             <a:fld id="{3A57EC39-4E20-4BC2-A092-74C62013EBA7}" type="datetimeFigureOut">
               <a:rPr lang="en-US" smtClean="0"/>
-              <a:t>11/26/2019</a:t>
+              <a:t>12/16/2019</a:t>
             </a:fld>
             <a:endParaRPr lang="en-US"/>
           </a:p>
@@ -13716,7 +13716,7 @@
           <a:p>
             <a:fld id="{3A57EC39-4E20-4BC2-A092-74C62013EBA7}" type="datetimeFigureOut">
               <a:rPr lang="en-US" smtClean="0"/>
-              <a:t>11/26/2019</a:t>
+              <a:t>12/16/2019</a:t>
             </a:fld>
             <a:endParaRPr lang="en-US"/>
           </a:p>
@@ -13829,7 +13829,7 @@
           <a:p>
             <a:fld id="{3A57EC39-4E20-4BC2-A092-74C62013EBA7}" type="datetimeFigureOut">
               <a:rPr lang="en-US" smtClean="0"/>
-              <a:t>11/26/2019</a:t>
+              <a:t>12/16/2019</a:t>
             </a:fld>
             <a:endParaRPr lang="en-US"/>
           </a:p>
@@ -14140,7 +14140,7 @@
           <a:p>
             <a:fld id="{3A57EC39-4E20-4BC2-A092-74C62013EBA7}" type="datetimeFigureOut">
               <a:rPr lang="en-US" smtClean="0"/>
-              <a:t>11/26/2019</a:t>
+              <a:t>12/16/2019</a:t>
             </a:fld>
             <a:endParaRPr lang="en-US"/>
           </a:p>
@@ -14428,7 +14428,7 @@
           <a:p>
             <a:fld id="{3A57EC39-4E20-4BC2-A092-74C62013EBA7}" type="datetimeFigureOut">
               <a:rPr lang="en-US" smtClean="0"/>
-              <a:t>11/26/2019</a:t>
+              <a:t>12/16/2019</a:t>
             </a:fld>
             <a:endParaRPr lang="en-US"/>
           </a:p>
@@ -14669,7 +14669,7 @@
           <a:p>
             <a:fld id="{3A57EC39-4E20-4BC2-A092-74C62013EBA7}" type="datetimeFigureOut">
               <a:rPr lang="en-US" smtClean="0"/>
-              <a:t>11/26/2019</a:t>
+              <a:t>12/16/2019</a:t>
             </a:fld>
             <a:endParaRPr lang="en-US"/>
           </a:p>
@@ -15626,6 +15626,44 @@
           </a:p>
         </p:txBody>
       </p:sp>
+      <p:sp>
+        <p:nvSpPr>
+          <p:cNvPr id="2" name="TextBox 1">
+            <a:extLst>
+              <a:ext uri="{FF2B5EF4-FFF2-40B4-BE49-F238E27FC236}">
+                <a16:creationId xmlns:a16="http://schemas.microsoft.com/office/drawing/2014/main" id="{A85C36FB-1AAA-4487-AF9B-A18021C0ECD2}"/>
+              </a:ext>
+            </a:extLst>
+          </p:cNvPr>
+          <p:cNvSpPr txBox="1"/>
+          <p:nvPr/>
+        </p:nvSpPr>
+        <p:spPr>
+          <a:xfrm>
+            <a:off x="954157" y="5327374"/>
+            <a:ext cx="5130958" cy="369332"/>
+          </a:xfrm>
+          <a:prstGeom prst="rect">
+            <a:avLst/>
+          </a:prstGeom>
+          <a:noFill/>
+        </p:spPr>
+        <p:txBody>
+          <a:bodyPr wrap="square" rtlCol="0">
+            <a:spAutoFit/>
+          </a:bodyPr>
+          <a:lstStyle/>
+          <a:p>
+            <a:r>
+              <a:rPr lang="en-US" dirty="0">
+                <a:hlinkClick r:id="rId3"/>
+              </a:rPr>
+              <a:t>https://github.com/sudhakar3697/PWA-Sample</a:t>
+            </a:r>
+            <a:endParaRPr lang="en-US" dirty="0"/>
+          </a:p>
+        </p:txBody>
+      </p:sp>
     </p:spTree>
     <p:extLst>
       <p:ext uri="{BB962C8B-B14F-4D97-AF65-F5344CB8AC3E}">
@@ -16343,7 +16381,7 @@
         </p:spPr>
         <p:txBody>
           <a:bodyPr anchor="t">
-            <a:normAutofit/>
+            <a:normAutofit lnSpcReduction="10000"/>
           </a:bodyPr>
           <a:lstStyle/>
           <a:p>
@@ -16387,6 +16425,23 @@
                 </a:solidFill>
               </a:rPr>
               <a:t>Hybrid</a:t>
+            </a:r>
+          </a:p>
+          <a:p>
+            <a:endParaRPr lang="en-US" sz="2000" dirty="0">
+              <a:solidFill>
+                <a:srgbClr val="FFFFFF"/>
+              </a:solidFill>
+            </a:endParaRPr>
+          </a:p>
+          <a:p>
+            <a:r>
+              <a:rPr lang="en-US" sz="2000">
+                <a:solidFill>
+                  <a:srgbClr val="FFFFFF"/>
+                </a:solidFill>
+              </a:rPr>
+              <a:t>TWA</a:t>
             </a:r>
           </a:p>
           <a:p>

</xml_diff>